<commit_message>
Slight modifications of the pptx
</commit_message>
<xml_diff>
--- a/uml2javapresentation.pptx
+++ b/uml2javapresentation.pptx
@@ -8,6 +8,8 @@
     <p:sldId id="256" r:id="rId2"/>
     <p:sldId id="258" r:id="rId3"/>
     <p:sldId id="257" r:id="rId4"/>
+    <p:sldId id="259" r:id="rId5"/>
+    <p:sldId id="260" r:id="rId6"/>
   </p:sldIdLst>
   <p:sldSz cx="9144000" cy="6858000" type="screen4x3"/>
   <p:notesSz cx="6858000" cy="9144000"/>
@@ -14635,14 +14637,21 @@
                 <a:latin typeface="Calibri" pitchFamily="34" charset="0"/>
                 <a:cs typeface="Calibri" pitchFamily="34" charset="0"/>
               </a:rPr>
-              <a:t>Malỳ</a:t>
+              <a:t>Malý</a:t>
             </a:r>
             <a:r>
               <a:rPr lang="en-GB" dirty="0" smtClean="0">
                 <a:latin typeface="Calibri" pitchFamily="34" charset="0"/>
                 <a:cs typeface="Calibri" pitchFamily="34" charset="0"/>
               </a:rPr>
-              <a:t>, Sam </a:t>
+              <a:t>, </a:t>
+            </a:r>
+            <a:r>
+              <a:rPr lang="en-GB" dirty="0" smtClean="0">
+                <a:latin typeface="Calibri" pitchFamily="34" charset="0"/>
+                <a:cs typeface="Calibri" pitchFamily="34" charset="0"/>
+              </a:rPr>
+              <a:t>Sam </a:t>
             </a:r>
             <a:r>
               <a:rPr lang="en-GB" dirty="0" err="1" smtClean="0">
@@ -14678,7 +14687,7 @@
   <p:timing>
     <p:tnLst>
       <p:par>
-        <p:cTn id="1" dur="indefinite" restart="never" nodeType="tmRoot"/>
+        <p:cTn xmlns:p14="http://schemas.microsoft.com/office/powerpoint/2010/main" id="1" dur="indefinite" restart="never" nodeType="tmRoot"/>
       </p:par>
     </p:tnLst>
   </p:timing>
@@ -14738,8 +14747,19 @@
           <a:p>
             <a:r>
               <a:rPr lang="en-GB" sz="2000" dirty="0" smtClean="0"/>
-              <a:t>Add Relationships/Cardinalities between classes &amp; movement of points</a:t>
+              <a:t>Add Relationships/Cardinalities between classes &amp; movement of </a:t>
             </a:r>
+            <a:r>
+              <a:rPr lang="en-GB" sz="2000" dirty="0" smtClean="0"/>
+              <a:t>points</a:t>
+            </a:r>
+          </a:p>
+          <a:p>
+            <a:r>
+              <a:rPr lang="en-GB" sz="2000" dirty="0" smtClean="0"/>
+              <a:t>Deleting elements</a:t>
+            </a:r>
+            <a:endParaRPr lang="en-GB" sz="2000" dirty="0" smtClean="0"/>
           </a:p>
           <a:p>
             <a:r>
@@ -14757,14 +14777,37 @@
           <a:p>
             <a:r>
               <a:rPr lang="en-GB" sz="2000" dirty="0" smtClean="0"/>
-              <a:t>Allow undo/redoing of actions by the user</a:t>
+              <a:t>Allow undo/redoing of actions by the </a:t>
+            </a:r>
+            <a:r>
+              <a:rPr lang="en-GB" sz="2000" dirty="0" smtClean="0"/>
+              <a:t>user</a:t>
             </a:r>
           </a:p>
           <a:p>
             <a:r>
               <a:rPr lang="en-GB" sz="2000" dirty="0" smtClean="0"/>
-              <a:t>Export diagram to .java skeleton representation</a:t>
+              <a:t>Changing fonts &amp; canvas size</a:t>
             </a:r>
+            <a:endParaRPr lang="en-GB" sz="2000" dirty="0" smtClean="0"/>
+          </a:p>
+          <a:p>
+            <a:r>
+              <a:rPr lang="en-GB" sz="2000" dirty="0" smtClean="0"/>
+              <a:t>Saving, loading files, opening new documents</a:t>
+            </a:r>
+            <a:endParaRPr lang="en-GB" sz="2000" dirty="0" smtClean="0"/>
+          </a:p>
+          <a:p>
+            <a:r>
+              <a:rPr lang="en-GB" sz="2000" dirty="0" smtClean="0"/>
+              <a:t>Export diagram to .java skeleton </a:t>
+            </a:r>
+            <a:r>
+              <a:rPr lang="en-GB" sz="2000" dirty="0" smtClean="0"/>
+              <a:t>code</a:t>
+            </a:r>
+            <a:endParaRPr lang="en-GB" sz="2000" dirty="0" smtClean="0"/>
           </a:p>
           <a:p>
             <a:r>
@@ -14777,8 +14820,13 @@
             </a:r>
             <a:r>
               <a:rPr lang="en-GB" sz="2000" dirty="0" smtClean="0"/>
-              <a:t>, .gif, .jpg)</a:t>
+              <a:t>, .gif, .jpg</a:t>
             </a:r>
+            <a:r>
+              <a:rPr lang="en-GB" sz="2000" dirty="0" smtClean="0"/>
+              <a:t>) &amp; print</a:t>
+            </a:r>
+            <a:endParaRPr lang="en-GB" sz="2000" dirty="0" smtClean="0"/>
           </a:p>
           <a:p>
             <a:endParaRPr lang="en-GB" sz="2000" dirty="0" smtClean="0"/>
@@ -14841,70 +14889,6 @@
           <a:chExt cx="0" cy="0"/>
         </a:xfrm>
       </p:grpSpPr>
-      <p:pic>
-        <p:nvPicPr>
-          <p:cNvPr id="1026" name="Picture 2"/>
-          <p:cNvPicPr>
-            <a:picLocks noChangeAspect="1" noChangeArrowheads="1"/>
-          </p:cNvPicPr>
-          <p:nvPr/>
-        </p:nvPicPr>
-        <p:blipFill>
-          <a:blip r:embed="rId2">
-            <a:extLst>
-              <a:ext uri="{28A0092B-C50C-407E-A947-70E740481C1C}">
-                <a14:useLocalDpi xmlns:a14="http://schemas.microsoft.com/office/drawing/2010/main" val="0"/>
-              </a:ext>
-            </a:extLst>
-          </a:blip>
-          <a:srcRect/>
-          <a:stretch>
-            <a:fillRect/>
-          </a:stretch>
-        </p:blipFill>
-        <p:spPr bwMode="auto">
-          <a:xfrm>
-            <a:off x="1263013" y="1556792"/>
-            <a:ext cx="6624736" cy="4968552"/>
-          </a:xfrm>
-          <a:prstGeom prst="rect">
-            <a:avLst/>
-          </a:prstGeom>
-          <a:noFill/>
-          <a:ln>
-            <a:noFill/>
-          </a:ln>
-          <a:effectLst/>
-          <a:extLst>
-            <a:ext uri="{909E8E84-426E-40DD-AFC4-6F175D3DCCD1}">
-              <a14:hiddenFill xmlns:a14="http://schemas.microsoft.com/office/drawing/2010/main">
-                <a:solidFill>
-                  <a:schemeClr val="accent1"/>
-                </a:solidFill>
-              </a14:hiddenFill>
-            </a:ext>
-            <a:ext uri="{91240B29-F687-4F45-9708-019B960494DF}">
-              <a14:hiddenLine xmlns:a14="http://schemas.microsoft.com/office/drawing/2010/main" w="9525">
-                <a:solidFill>
-                  <a:schemeClr val="tx1"/>
-                </a:solidFill>
-                <a:miter lim="800000"/>
-                <a:headEnd/>
-                <a:tailEnd/>
-              </a14:hiddenLine>
-            </a:ext>
-            <a:ext uri="{AF507438-7753-43E0-B8FC-AC1667EBCBE1}">
-              <a14:hiddenEffects xmlns:a14="http://schemas.microsoft.com/office/drawing/2010/main">
-                <a:effectLst>
-                  <a:outerShdw dist="35921" dir="2700000" algn="ctr" rotWithShape="0">
-                    <a:schemeClr val="bg2"/>
-                  </a:outerShdw>
-                </a:effectLst>
-              </a14:hiddenEffects>
-            </a:ext>
-          </a:extLst>
-        </p:spPr>
-      </p:pic>
       <p:sp>
         <p:nvSpPr>
           <p:cNvPr id="4" name="Title 3"/>
@@ -14922,7 +14906,7 @@
           <a:p>
             <a:r>
               <a:rPr lang="en-GB" dirty="0" smtClean="0"/>
-              <a:t>Our User Interface</a:t>
+              <a:t>Demonstration</a:t>
             </a:r>
             <a:endParaRPr lang="en-GB" dirty="0"/>
           </a:p>
@@ -14941,10 +14925,116 @@
   <p:timing>
     <p:tnLst>
       <p:par>
-        <p:cTn id="1" dur="indefinite" restart="never" nodeType="tmRoot"/>
+        <p:cTn xmlns:p14="http://schemas.microsoft.com/office/powerpoint/2010/main" id="1" dur="indefinite" restart="never" nodeType="tmRoot"/>
       </p:par>
     </p:tnLst>
   </p:timing>
+</p:sld>
+</file>
+
+<file path=ppt/slides/slide4.xml><?xml version="1.0" encoding="utf-8"?>
+<p:sld xmlns:a="http://schemas.openxmlformats.org/drawingml/2006/main" xmlns:r="http://schemas.openxmlformats.org/officeDocument/2006/relationships" xmlns:p="http://schemas.openxmlformats.org/presentationml/2006/main">
+  <p:cSld>
+    <p:spTree>
+      <p:nvGrpSpPr>
+        <p:cNvPr id="1" name=""/>
+        <p:cNvGrpSpPr/>
+        <p:nvPr/>
+      </p:nvGrpSpPr>
+      <p:grpSpPr>
+        <a:xfrm>
+          <a:off x="0" y="0"/>
+          <a:ext cx="0" cy="0"/>
+          <a:chOff x="0" y="0"/>
+          <a:chExt cx="0" cy="0"/>
+        </a:xfrm>
+      </p:grpSpPr>
+      <p:sp>
+        <p:nvSpPr>
+          <p:cNvPr id="2" name="Title 1"/>
+          <p:cNvSpPr>
+            <a:spLocks noGrp="1"/>
+          </p:cNvSpPr>
+          <p:nvPr>
+            <p:ph type="title"/>
+          </p:nvPr>
+        </p:nvSpPr>
+        <p:spPr/>
+        <p:txBody>
+          <a:bodyPr/>
+          <a:lstStyle/>
+          <a:p>
+            <a:r>
+              <a:rPr lang="en-US" dirty="0" smtClean="0"/>
+              <a:t>Brief overview of the design</a:t>
+            </a:r>
+            <a:endParaRPr lang="en-US" dirty="0"/>
+          </a:p>
+        </p:txBody>
+      </p:sp>
+    </p:spTree>
+    <p:extLst>
+      <p:ext uri="{BB962C8B-B14F-4D97-AF65-F5344CB8AC3E}">
+        <p14:creationId xmlns:p14="http://schemas.microsoft.com/office/powerpoint/2010/main" val="4226971406"/>
+      </p:ext>
+    </p:extLst>
+  </p:cSld>
+  <p:clrMapOvr>
+    <a:masterClrMapping/>
+  </p:clrMapOvr>
+</p:sld>
+</file>
+
+<file path=ppt/slides/slide5.xml><?xml version="1.0" encoding="utf-8"?>
+<p:sld xmlns:a="http://schemas.openxmlformats.org/drawingml/2006/main" xmlns:r="http://schemas.openxmlformats.org/officeDocument/2006/relationships" xmlns:p="http://schemas.openxmlformats.org/presentationml/2006/main">
+  <p:cSld>
+    <p:spTree>
+      <p:nvGrpSpPr>
+        <p:cNvPr id="1" name=""/>
+        <p:cNvGrpSpPr/>
+        <p:nvPr/>
+      </p:nvGrpSpPr>
+      <p:grpSpPr>
+        <a:xfrm>
+          <a:off x="0" y="0"/>
+          <a:ext cx="0" cy="0"/>
+          <a:chOff x="0" y="0"/>
+          <a:chExt cx="0" cy="0"/>
+        </a:xfrm>
+      </p:grpSpPr>
+      <p:sp>
+        <p:nvSpPr>
+          <p:cNvPr id="2" name="Title 1"/>
+          <p:cNvSpPr>
+            <a:spLocks noGrp="1"/>
+          </p:cNvSpPr>
+          <p:nvPr>
+            <p:ph type="title"/>
+          </p:nvPr>
+        </p:nvSpPr>
+        <p:spPr/>
+        <p:txBody>
+          <a:bodyPr/>
+          <a:lstStyle/>
+          <a:p>
+            <a:r>
+              <a:rPr lang="en-US" dirty="0" smtClean="0"/>
+              <a:t>Future development?</a:t>
+            </a:r>
+            <a:endParaRPr lang="en-US" dirty="0"/>
+          </a:p>
+        </p:txBody>
+      </p:sp>
+    </p:spTree>
+    <p:extLst>
+      <p:ext uri="{BB962C8B-B14F-4D97-AF65-F5344CB8AC3E}">
+        <p14:creationId xmlns:p14="http://schemas.microsoft.com/office/powerpoint/2010/main" val="2658496298"/>
+      </p:ext>
+    </p:extLst>
+  </p:cSld>
+  <p:clrMapOvr>
+    <a:masterClrMapping/>
+  </p:clrMapOvr>
 </p:sld>
 </file>
 

</xml_diff>

<commit_message>
Presentation update with design diagram
</commit_message>
<xml_diff>
--- a/uml2javapresentation.pptx
+++ b/uml2javapresentation.pptx
@@ -1923,7 +1923,7 @@
           <a:p>
             <a:fld id="{78C24CDC-33EB-4D13-A8BB-19C44C79459B}" type="datetimeFigureOut">
               <a:rPr lang="en-GB" smtClean="0"/>
-              <a:t>14/03/2012</a:t>
+              <a:t>15/03/2012</a:t>
             </a:fld>
             <a:endParaRPr lang="en-GB"/>
           </a:p>
@@ -2104,7 +2104,7 @@
           <a:p>
             <a:fld id="{78C24CDC-33EB-4D13-A8BB-19C44C79459B}" type="datetimeFigureOut">
               <a:rPr lang="en-GB" smtClean="0"/>
-              <a:t>14/03/2012</a:t>
+              <a:t>15/03/2012</a:t>
             </a:fld>
             <a:endParaRPr lang="en-GB"/>
           </a:p>
@@ -2255,7 +2255,7 @@
           <a:p>
             <a:fld id="{78C24CDC-33EB-4D13-A8BB-19C44C79459B}" type="datetimeFigureOut">
               <a:rPr lang="en-GB" smtClean="0"/>
-              <a:t>14/03/2012</a:t>
+              <a:t>15/03/2012</a:t>
             </a:fld>
             <a:endParaRPr lang="en-GB"/>
           </a:p>
@@ -4081,7 +4081,7 @@
           <a:p>
             <a:fld id="{78C24CDC-33EB-4D13-A8BB-19C44C79459B}" type="datetimeFigureOut">
               <a:rPr lang="en-GB" smtClean="0"/>
-              <a:t>14/03/2012</a:t>
+              <a:t>15/03/2012</a:t>
             </a:fld>
             <a:endParaRPr lang="en-GB"/>
           </a:p>
@@ -5951,7 +5951,7 @@
           <a:p>
             <a:fld id="{78C24CDC-33EB-4D13-A8BB-19C44C79459B}" type="datetimeFigureOut">
               <a:rPr lang="en-GB" smtClean="0"/>
-              <a:t>14/03/2012</a:t>
+              <a:t>15/03/2012</a:t>
             </a:fld>
             <a:endParaRPr lang="en-GB"/>
           </a:p>
@@ -6064,7 +6064,7 @@
           <a:p>
             <a:fld id="{78C24CDC-33EB-4D13-A8BB-19C44C79459B}" type="datetimeFigureOut">
               <a:rPr lang="en-GB" smtClean="0"/>
-              <a:t>14/03/2012</a:t>
+              <a:t>15/03/2012</a:t>
             </a:fld>
             <a:endParaRPr lang="en-GB"/>
           </a:p>
@@ -6605,7 +6605,7 @@
           <a:p>
             <a:fld id="{78C24CDC-33EB-4D13-A8BB-19C44C79459B}" type="datetimeFigureOut">
               <a:rPr lang="en-GB" smtClean="0"/>
-              <a:t>14/03/2012</a:t>
+              <a:t>15/03/2012</a:t>
             </a:fld>
             <a:endParaRPr lang="en-GB"/>
           </a:p>
@@ -6718,7 +6718,7 @@
           <a:p>
             <a:fld id="{78C24CDC-33EB-4D13-A8BB-19C44C79459B}" type="datetimeFigureOut">
               <a:rPr lang="en-GB" smtClean="0"/>
-              <a:t>14/03/2012</a:t>
+              <a:t>15/03/2012</a:t>
             </a:fld>
             <a:endParaRPr lang="en-GB"/>
           </a:p>
@@ -8429,7 +8429,7 @@
           <a:p>
             <a:fld id="{78C24CDC-33EB-4D13-A8BB-19C44C79459B}" type="datetimeFigureOut">
               <a:rPr lang="en-GB" smtClean="0"/>
-              <a:t>14/03/2012</a:t>
+              <a:t>15/03/2012</a:t>
             </a:fld>
             <a:endParaRPr lang="en-GB"/>
           </a:p>
@@ -8580,7 +8580,7 @@
           <a:p>
             <a:fld id="{78C24CDC-33EB-4D13-A8BB-19C44C79459B}" type="datetimeFigureOut">
               <a:rPr lang="en-GB" smtClean="0"/>
-              <a:t>14/03/2012</a:t>
+              <a:t>15/03/2012</a:t>
             </a:fld>
             <a:endParaRPr lang="en-GB"/>
           </a:p>
@@ -12195,7 +12195,7 @@
           <a:p>
             <a:fld id="{78C24CDC-33EB-4D13-A8BB-19C44C79459B}" type="datetimeFigureOut">
               <a:rPr lang="en-GB" smtClean="0"/>
-              <a:t>14/03/2012</a:t>
+              <a:t>15/03/2012</a:t>
             </a:fld>
             <a:endParaRPr lang="en-GB"/>
           </a:p>
@@ -14054,7 +14054,7 @@
           <a:p>
             <a:fld id="{78C24CDC-33EB-4D13-A8BB-19C44C79459B}" type="datetimeFigureOut">
               <a:rPr lang="en-GB" smtClean="0"/>
-              <a:t>14/03/2012</a:t>
+              <a:t>15/03/2012</a:t>
             </a:fld>
             <a:endParaRPr lang="en-GB"/>
           </a:p>
@@ -14644,14 +14644,7 @@
                 <a:latin typeface="Calibri" pitchFamily="34" charset="0"/>
                 <a:cs typeface="Calibri" pitchFamily="34" charset="0"/>
               </a:rPr>
-              <a:t>, </a:t>
-            </a:r>
-            <a:r>
-              <a:rPr lang="en-GB" dirty="0" smtClean="0">
-                <a:latin typeface="Calibri" pitchFamily="34" charset="0"/>
-                <a:cs typeface="Calibri" pitchFamily="34" charset="0"/>
-              </a:rPr>
-              <a:t>Sam </a:t>
+              <a:t>, Sam </a:t>
             </a:r>
             <a:r>
               <a:rPr lang="en-GB" dirty="0" err="1" smtClean="0">
@@ -14687,7 +14680,7 @@
   <p:timing>
     <p:tnLst>
       <p:par>
-        <p:cTn xmlns:p14="http://schemas.microsoft.com/office/powerpoint/2010/main" id="1" dur="indefinite" restart="never" nodeType="tmRoot"/>
+        <p:cTn id="1" dur="indefinite" restart="never" nodeType="tmRoot"/>
       </p:par>
     </p:tnLst>
   </p:timing>
@@ -14747,11 +14740,7 @@
           <a:p>
             <a:r>
               <a:rPr lang="en-GB" sz="2000" dirty="0" smtClean="0"/>
-              <a:t>Add Relationships/Cardinalities between classes &amp; movement of </a:t>
-            </a:r>
-            <a:r>
-              <a:rPr lang="en-GB" sz="2000" dirty="0" smtClean="0"/>
-              <a:t>points</a:t>
+              <a:t>Add Relationships/Cardinalities between classes &amp; movement of points</a:t>
             </a:r>
           </a:p>
           <a:p>
@@ -14759,7 +14748,6 @@
               <a:rPr lang="en-GB" sz="2000" dirty="0" smtClean="0"/>
               <a:t>Deleting elements</a:t>
             </a:r>
-            <a:endParaRPr lang="en-GB" sz="2000" dirty="0" smtClean="0"/>
           </a:p>
           <a:p>
             <a:r>
@@ -14777,11 +14765,7 @@
           <a:p>
             <a:r>
               <a:rPr lang="en-GB" sz="2000" dirty="0" smtClean="0"/>
-              <a:t>Allow undo/redoing of actions by the </a:t>
-            </a:r>
-            <a:r>
-              <a:rPr lang="en-GB" sz="2000" dirty="0" smtClean="0"/>
-              <a:t>user</a:t>
+              <a:t>Allow undo/redoing of actions by the user</a:t>
             </a:r>
           </a:p>
           <a:p>
@@ -14789,25 +14773,18 @@
               <a:rPr lang="en-GB" sz="2000" dirty="0" smtClean="0"/>
               <a:t>Changing fonts &amp; canvas size</a:t>
             </a:r>
-            <a:endParaRPr lang="en-GB" sz="2000" dirty="0" smtClean="0"/>
           </a:p>
           <a:p>
             <a:r>
               <a:rPr lang="en-GB" sz="2000" dirty="0" smtClean="0"/>
               <a:t>Saving, loading files, opening new documents</a:t>
             </a:r>
-            <a:endParaRPr lang="en-GB" sz="2000" dirty="0" smtClean="0"/>
           </a:p>
           <a:p>
             <a:r>
               <a:rPr lang="en-GB" sz="2000" dirty="0" smtClean="0"/>
-              <a:t>Export diagram to .java skeleton </a:t>
+              <a:t>Export diagram to .java skeleton code</a:t>
             </a:r>
-            <a:r>
-              <a:rPr lang="en-GB" sz="2000" dirty="0" smtClean="0"/>
-              <a:t>code</a:t>
-            </a:r>
-            <a:endParaRPr lang="en-GB" sz="2000" dirty="0" smtClean="0"/>
           </a:p>
           <a:p>
             <a:r>
@@ -14820,13 +14797,8 @@
             </a:r>
             <a:r>
               <a:rPr lang="en-GB" sz="2000" dirty="0" smtClean="0"/>
-              <a:t>, .gif, .jpg</a:t>
+              <a:t>, .gif, .jpg) &amp; print</a:t>
             </a:r>
-            <a:r>
-              <a:rPr lang="en-GB" sz="2000" dirty="0" smtClean="0"/>
-              <a:t>) &amp; print</a:t>
-            </a:r>
-            <a:endParaRPr lang="en-GB" sz="2000" dirty="0" smtClean="0"/>
           </a:p>
           <a:p>
             <a:endParaRPr lang="en-GB" sz="2000" dirty="0" smtClean="0"/>
@@ -14925,7 +14897,7 @@
   <p:timing>
     <p:tnLst>
       <p:par>
-        <p:cTn xmlns:p14="http://schemas.microsoft.com/office/powerpoint/2010/main" id="1" dur="indefinite" restart="never" nodeType="tmRoot"/>
+        <p:cTn id="1" dur="indefinite" restart="never" nodeType="tmRoot"/>
       </p:par>
     </p:tnLst>
   </p:timing>
@@ -14972,6 +14944,46 @@
           </a:p>
         </p:txBody>
       </p:sp>
+      <p:pic>
+        <p:nvPicPr>
+          <p:cNvPr id="4" name="Picture 3"/>
+          <p:cNvPicPr>
+            <a:picLocks noChangeAspect="1"/>
+          </p:cNvPicPr>
+          <p:nvPr/>
+        </p:nvPicPr>
+        <p:blipFill>
+          <a:blip r:embed="rId2" cstate="print">
+            <a:clrChange>
+              <a:clrFrom>
+                <a:srgbClr val="FFFFFF"/>
+              </a:clrFrom>
+              <a:clrTo>
+                <a:srgbClr val="FFFFFF">
+                  <a:alpha val="0"/>
+                </a:srgbClr>
+              </a:clrTo>
+            </a:clrChange>
+            <a:extLst>
+              <a:ext uri="{28A0092B-C50C-407E-A947-70E740481C1C}">
+                <a14:useLocalDpi xmlns:a14="http://schemas.microsoft.com/office/drawing/2010/main" val="0"/>
+              </a:ext>
+            </a:extLst>
+          </a:blip>
+          <a:stretch>
+            <a:fillRect/>
+          </a:stretch>
+        </p:blipFill>
+        <p:spPr>
+          <a:xfrm>
+            <a:off x="755576" y="1272292"/>
+            <a:ext cx="7596336" cy="5417082"/>
+          </a:xfrm>
+          <a:prstGeom prst="rect">
+            <a:avLst/>
+          </a:prstGeom>
+        </p:spPr>
+      </p:pic>
     </p:spTree>
     <p:extLst>
       <p:ext uri="{BB962C8B-B14F-4D97-AF65-F5344CB8AC3E}">
@@ -14982,6 +14994,13 @@
   <p:clrMapOvr>
     <a:masterClrMapping/>
   </p:clrMapOvr>
+  <p:timing>
+    <p:tnLst>
+      <p:par>
+        <p:cTn id="1" dur="indefinite" restart="never" nodeType="tmRoot"/>
+      </p:par>
+    </p:tnLst>
+  </p:timing>
 </p:sld>
 </file>
 
@@ -15035,6 +15054,13 @@
   <p:clrMapOvr>
     <a:masterClrMapping/>
   </p:clrMapOvr>
+  <p:timing>
+    <p:tnLst>
+      <p:par>
+        <p:cTn id="1" dur="indefinite" restart="never" nodeType="tmRoot"/>
+      </p:par>
+    </p:tnLst>
+  </p:timing>
 </p:sld>
 </file>
 

</xml_diff>

<commit_message>
Addition into the slide
</commit_message>
<xml_diff>
--- a/uml2javapresentation.pptx
+++ b/uml2javapresentation.pptx
@@ -1923,7 +1923,7 @@
           <a:p>
             <a:fld id="{78C24CDC-33EB-4D13-A8BB-19C44C79459B}" type="datetimeFigureOut">
               <a:rPr lang="en-GB" smtClean="0"/>
-              <a:t>15/03/2012</a:t>
+              <a:t>16/03/2012</a:t>
             </a:fld>
             <a:endParaRPr lang="en-GB"/>
           </a:p>
@@ -2104,7 +2104,7 @@
           <a:p>
             <a:fld id="{78C24CDC-33EB-4D13-A8BB-19C44C79459B}" type="datetimeFigureOut">
               <a:rPr lang="en-GB" smtClean="0"/>
-              <a:t>15/03/2012</a:t>
+              <a:t>16/03/2012</a:t>
             </a:fld>
             <a:endParaRPr lang="en-GB"/>
           </a:p>
@@ -2255,7 +2255,7 @@
           <a:p>
             <a:fld id="{78C24CDC-33EB-4D13-A8BB-19C44C79459B}" type="datetimeFigureOut">
               <a:rPr lang="en-GB" smtClean="0"/>
-              <a:t>15/03/2012</a:t>
+              <a:t>16/03/2012</a:t>
             </a:fld>
             <a:endParaRPr lang="en-GB"/>
           </a:p>
@@ -4081,7 +4081,7 @@
           <a:p>
             <a:fld id="{78C24CDC-33EB-4D13-A8BB-19C44C79459B}" type="datetimeFigureOut">
               <a:rPr lang="en-GB" smtClean="0"/>
-              <a:t>15/03/2012</a:t>
+              <a:t>16/03/2012</a:t>
             </a:fld>
             <a:endParaRPr lang="en-GB"/>
           </a:p>
@@ -5951,7 +5951,7 @@
           <a:p>
             <a:fld id="{78C24CDC-33EB-4D13-A8BB-19C44C79459B}" type="datetimeFigureOut">
               <a:rPr lang="en-GB" smtClean="0"/>
-              <a:t>15/03/2012</a:t>
+              <a:t>16/03/2012</a:t>
             </a:fld>
             <a:endParaRPr lang="en-GB"/>
           </a:p>
@@ -6064,7 +6064,7 @@
           <a:p>
             <a:fld id="{78C24CDC-33EB-4D13-A8BB-19C44C79459B}" type="datetimeFigureOut">
               <a:rPr lang="en-GB" smtClean="0"/>
-              <a:t>15/03/2012</a:t>
+              <a:t>16/03/2012</a:t>
             </a:fld>
             <a:endParaRPr lang="en-GB"/>
           </a:p>
@@ -6605,7 +6605,7 @@
           <a:p>
             <a:fld id="{78C24CDC-33EB-4D13-A8BB-19C44C79459B}" type="datetimeFigureOut">
               <a:rPr lang="en-GB" smtClean="0"/>
-              <a:t>15/03/2012</a:t>
+              <a:t>16/03/2012</a:t>
             </a:fld>
             <a:endParaRPr lang="en-GB"/>
           </a:p>
@@ -6718,7 +6718,7 @@
           <a:p>
             <a:fld id="{78C24CDC-33EB-4D13-A8BB-19C44C79459B}" type="datetimeFigureOut">
               <a:rPr lang="en-GB" smtClean="0"/>
-              <a:t>15/03/2012</a:t>
+              <a:t>16/03/2012</a:t>
             </a:fld>
             <a:endParaRPr lang="en-GB"/>
           </a:p>
@@ -8429,7 +8429,7 @@
           <a:p>
             <a:fld id="{78C24CDC-33EB-4D13-A8BB-19C44C79459B}" type="datetimeFigureOut">
               <a:rPr lang="en-GB" smtClean="0"/>
-              <a:t>15/03/2012</a:t>
+              <a:t>16/03/2012</a:t>
             </a:fld>
             <a:endParaRPr lang="en-GB"/>
           </a:p>
@@ -8580,7 +8580,7 @@
           <a:p>
             <a:fld id="{78C24CDC-33EB-4D13-A8BB-19C44C79459B}" type="datetimeFigureOut">
               <a:rPr lang="en-GB" smtClean="0"/>
-              <a:t>15/03/2012</a:t>
+              <a:t>16/03/2012</a:t>
             </a:fld>
             <a:endParaRPr lang="en-GB"/>
           </a:p>
@@ -12195,7 +12195,7 @@
           <a:p>
             <a:fld id="{78C24CDC-33EB-4D13-A8BB-19C44C79459B}" type="datetimeFigureOut">
               <a:rPr lang="en-GB" smtClean="0"/>
-              <a:t>15/03/2012</a:t>
+              <a:t>16/03/2012</a:t>
             </a:fld>
             <a:endParaRPr lang="en-GB"/>
           </a:p>
@@ -14054,7 +14054,7 @@
           <a:p>
             <a:fld id="{78C24CDC-33EB-4D13-A8BB-19C44C79459B}" type="datetimeFigureOut">
               <a:rPr lang="en-GB" smtClean="0"/>
-              <a:t>15/03/2012</a:t>
+              <a:t>16/03/2012</a:t>
             </a:fld>
             <a:endParaRPr lang="en-GB"/>
           </a:p>
@@ -14668,6 +14668,9 @@
         </p:txBody>
       </p:sp>
     </p:spTree>
+    <p:custDataLst>
+      <p:tags r:id="rId1"/>
+    </p:custDataLst>
     <p:extLst>
       <p:ext uri="{BB962C8B-B14F-4D97-AF65-F5344CB8AC3E}">
         <p14:creationId xmlns:p14="http://schemas.microsoft.com/office/powerpoint/2010/main" val="2877341872"/>
@@ -14680,7 +14683,7 @@
   <p:timing>
     <p:tnLst>
       <p:par>
-        <p:cTn xmlns:p14="http://schemas.microsoft.com/office/powerpoint/2010/main" id="1" dur="indefinite" restart="never" nodeType="tmRoot"/>
+        <p:cTn id="1" dur="indefinite" restart="never" nodeType="tmRoot"/>
       </p:par>
     </p:tnLst>
   </p:timing>
@@ -14740,8 +14743,20 @@
           <a:p>
             <a:r>
               <a:rPr lang="en-GB" sz="2000" dirty="0" smtClean="0"/>
-              <a:t>Add Relationships/Cardinalities between classes &amp; movement of points</a:t>
+              <a:t>Add Relationships/Cardinalities between classes &amp; movement of </a:t>
             </a:r>
+            <a:r>
+              <a:rPr lang="en-GB" sz="2000" dirty="0" smtClean="0"/>
+              <a:t>points</a:t>
+            </a:r>
+          </a:p>
+          <a:p>
+            <a:pPr lvl="1"/>
+            <a:r>
+              <a:rPr lang="en-GB" sz="1600" dirty="0" smtClean="0"/>
+              <a:t>Alter Java code to incorporate the relationships</a:t>
+            </a:r>
+            <a:endParaRPr lang="en-GB" sz="1600" dirty="0" smtClean="0"/>
           </a:p>
           <a:p>
             <a:r>
@@ -14752,13 +14767,18 @@
           <a:p>
             <a:r>
               <a:rPr lang="en-GB" sz="2000" dirty="0" smtClean="0"/>
-              <a:t>Allow change modifiers to classes methods and attributes</a:t>
+              <a:t>Allow change modifiers to classes methods and </a:t>
             </a:r>
+            <a:r>
+              <a:rPr lang="en-GB" sz="2000" dirty="0" smtClean="0"/>
+              <a:t>attributes</a:t>
+            </a:r>
+            <a:endParaRPr lang="en-GB" sz="2000" dirty="0" smtClean="0"/>
           </a:p>
           <a:p>
             <a:pPr lvl="1"/>
             <a:r>
-              <a:rPr lang="en-GB" sz="2000" dirty="0" smtClean="0"/>
+              <a:rPr lang="en-GB" sz="1600" dirty="0" smtClean="0"/>
               <a:t>Abstract/Static/Final/Transient</a:t>
             </a:r>
           </a:p>
@@ -14832,6 +14852,9 @@
         </p:txBody>
       </p:sp>
     </p:spTree>
+    <p:custDataLst>
+      <p:tags r:id="rId1"/>
+    </p:custDataLst>
     <p:extLst>
       <p:ext uri="{BB962C8B-B14F-4D97-AF65-F5344CB8AC3E}">
         <p14:creationId xmlns:p14="http://schemas.microsoft.com/office/powerpoint/2010/main" val="4042929669"/>
@@ -14841,6 +14864,13 @@
   <p:clrMapOvr>
     <a:masterClrMapping/>
   </p:clrMapOvr>
+  <p:timing>
+    <p:tnLst>
+      <p:par>
+        <p:cTn id="1" dur="indefinite" restart="never" nodeType="tmRoot"/>
+      </p:par>
+    </p:tnLst>
+  </p:timing>
 </p:sld>
 </file>
 
@@ -14915,6 +14945,9 @@
         </p:txBody>
       </p:sp>
     </p:spTree>
+    <p:custDataLst>
+      <p:tags r:id="rId1"/>
+    </p:custDataLst>
     <p:extLst>
       <p:ext uri="{BB962C8B-B14F-4D97-AF65-F5344CB8AC3E}">
         <p14:creationId xmlns:p14="http://schemas.microsoft.com/office/powerpoint/2010/main" val="2545066006"/>
@@ -14927,7 +14960,7 @@
   <p:timing>
     <p:tnLst>
       <p:par>
-        <p:cTn xmlns:p14="http://schemas.microsoft.com/office/powerpoint/2010/main" id="1" dur="indefinite" restart="never" nodeType="tmRoot"/>
+        <p:cTn id="1" dur="indefinite" restart="never" nodeType="tmRoot"/>
       </p:par>
     </p:tnLst>
   </p:timing>
@@ -14983,7 +15016,7 @@
           <p:nvPr/>
         </p:nvPicPr>
         <p:blipFill>
-          <a:blip r:embed="rId2" cstate="print">
+          <a:blip r:embed="rId3" cstate="print">
             <a:clrChange>
               <a:clrFrom>
                 <a:srgbClr val="FFFFFF"/>
@@ -15015,6 +15048,9 @@
         </p:spPr>
       </p:pic>
     </p:spTree>
+    <p:custDataLst>
+      <p:tags r:id="rId1"/>
+    </p:custDataLst>
     <p:extLst>
       <p:ext uri="{BB962C8B-B14F-4D97-AF65-F5344CB8AC3E}">
         <p14:creationId xmlns:p14="http://schemas.microsoft.com/office/powerpoint/2010/main" val="4226971406"/>
@@ -15027,7 +15063,7 @@
   <p:timing>
     <p:tnLst>
       <p:par>
-        <p:cTn xmlns:p14="http://schemas.microsoft.com/office/powerpoint/2010/main" id="1" dur="indefinite" restart="never" nodeType="tmRoot"/>
+        <p:cTn id="1" dur="indefinite" restart="never" nodeType="tmRoot"/>
       </p:par>
     </p:tnLst>
   </p:timing>
@@ -15294,6 +15330,9 @@
         </p:txBody>
       </p:sp>
     </p:spTree>
+    <p:custDataLst>
+      <p:tags r:id="rId1"/>
+    </p:custDataLst>
     <p:extLst>
       <p:ext uri="{BB962C8B-B14F-4D97-AF65-F5344CB8AC3E}">
         <p14:creationId xmlns:p14="http://schemas.microsoft.com/office/powerpoint/2010/main" val="2658496298"/>
@@ -15306,11 +15345,51 @@
   <p:timing>
     <p:tnLst>
       <p:par>
-        <p:cTn xmlns:p14="http://schemas.microsoft.com/office/powerpoint/2010/main" id="1" dur="indefinite" restart="never" nodeType="tmRoot"/>
+        <p:cTn id="1" dur="indefinite" restart="never" nodeType="tmRoot"/>
       </p:par>
     </p:tnLst>
   </p:timing>
 </p:sld>
+</file>
+
+<file path=ppt/tags/tag1.xml><?xml version="1.0" encoding="utf-8"?>
+<p:tagLst xmlns:a="http://schemas.openxmlformats.org/drawingml/2006/main" xmlns:r="http://schemas.openxmlformats.org/officeDocument/2006/relationships" xmlns:p="http://schemas.openxmlformats.org/presentationml/2006/main">
+  <p:tag name="POINTS" val="0"/>
+  <p:tag name="TIME" val="15"/>
+  <p:tag name="QUESTION" val="1"/>
+</p:tagLst>
+</file>
+
+<file path=ppt/tags/tag2.xml><?xml version="1.0" encoding="utf-8"?>
+<p:tagLst xmlns:a="http://schemas.openxmlformats.org/drawingml/2006/main" xmlns:r="http://schemas.openxmlformats.org/officeDocument/2006/relationships" xmlns:p="http://schemas.openxmlformats.org/presentationml/2006/main">
+  <p:tag name="POINTS" val="0"/>
+  <p:tag name="TIME" val="15"/>
+  <p:tag name="QUESTION" val="1"/>
+</p:tagLst>
+</file>
+
+<file path=ppt/tags/tag3.xml><?xml version="1.0" encoding="utf-8"?>
+<p:tagLst xmlns:a="http://schemas.openxmlformats.org/drawingml/2006/main" xmlns:r="http://schemas.openxmlformats.org/officeDocument/2006/relationships" xmlns:p="http://schemas.openxmlformats.org/presentationml/2006/main">
+  <p:tag name="POINTS" val="0"/>
+  <p:tag name="TIME" val="15"/>
+  <p:tag name="QUESTION" val="1"/>
+</p:tagLst>
+</file>
+
+<file path=ppt/tags/tag4.xml><?xml version="1.0" encoding="utf-8"?>
+<p:tagLst xmlns:a="http://schemas.openxmlformats.org/drawingml/2006/main" xmlns:r="http://schemas.openxmlformats.org/officeDocument/2006/relationships" xmlns:p="http://schemas.openxmlformats.org/presentationml/2006/main">
+  <p:tag name="POINTS" val="0"/>
+  <p:tag name="TIME" val="15"/>
+  <p:tag name="QUESTION" val="1"/>
+</p:tagLst>
+</file>
+
+<file path=ppt/tags/tag5.xml><?xml version="1.0" encoding="utf-8"?>
+<p:tagLst xmlns:a="http://schemas.openxmlformats.org/drawingml/2006/main" xmlns:r="http://schemas.openxmlformats.org/officeDocument/2006/relationships" xmlns:p="http://schemas.openxmlformats.org/presentationml/2006/main">
+  <p:tag name="POINTS" val="0"/>
+  <p:tag name="TIME" val="15"/>
+  <p:tag name="QUESTION" val="1"/>
+</p:tagLst>
 </file>
 
 <file path=ppt/theme/theme1.xml><?xml version="1.0" encoding="utf-8"?>

</xml_diff>